<commit_message>
20220401 1，升级至 for .net 6 2，添加Phenix.iPost解决方案 3，升级Phenix.Services.Host工程，以支持Dapr
</commit_message>
<xml_diff>
--- a/Phenix.iPost/Phenix.iPost.ROS.全智能码头实时作业调度系统设计方案.pptx
+++ b/Phenix.iPost/Phenix.iPost.ROS.全智能码头实时作业调度系统设计方案.pptx
@@ -250,7 +250,7 @@
             <a:fld id="{9AD89A4D-DCA1-4F8E-95E9-E487FD906CDF}" type="datetimeFigureOut">
               <a:rPr lang="zh-CN" altLang="en-US" smtClean="0"/>
               <a:pPr/>
-              <a:t>2022-03-31</a:t>
+              <a:t>2022-04-11</a:t>
             </a:fld>
             <a:endParaRPr lang="zh-CN" altLang="en-US"/>
           </a:p>
@@ -446,7 +446,7 @@
               <a:pPr>
                 <a:defRPr/>
               </a:pPr>
-              <a:t>2022-03-31</a:t>
+              <a:t>2022-04-11</a:t>
             </a:fld>
             <a:endParaRPr lang="zh-CN" altLang="en-US"/>
           </a:p>
@@ -835,7 +835,7 @@
             <a:fld id="{5CE71918-5BB5-48A1-B847-28BA0F6365FD}" type="datetimeFigureOut">
               <a:rPr lang="zh-CN" altLang="en-US" smtClean="0"/>
               <a:pPr/>
-              <a:t>2022-03-31</a:t>
+              <a:t>2022-04-11</a:t>
             </a:fld>
             <a:endParaRPr lang="zh-CN" altLang="en-US"/>
           </a:p>
@@ -1142,7 +1142,7 @@
             <a:fld id="{5CE71918-5BB5-48A1-B847-28BA0F6365FD}" type="datetimeFigureOut">
               <a:rPr lang="zh-CN" altLang="en-US" smtClean="0"/>
               <a:pPr/>
-              <a:t>2022-03-31</a:t>
+              <a:t>2022-04-11</a:t>
             </a:fld>
             <a:endParaRPr lang="zh-CN" altLang="en-US"/>
           </a:p>
@@ -1392,7 +1392,7 @@
             <a:fld id="{5CE71918-5BB5-48A1-B847-28BA0F6365FD}" type="datetimeFigureOut">
               <a:rPr lang="zh-CN" altLang="en-US" smtClean="0"/>
               <a:pPr/>
-              <a:t>2022-03-31</a:t>
+              <a:t>2022-04-11</a:t>
             </a:fld>
             <a:endParaRPr lang="zh-CN" altLang="en-US"/>
           </a:p>
@@ -1558,7 +1558,7 @@
             <a:fld id="{5CE71918-5BB5-48A1-B847-28BA0F6365FD}" type="datetimeFigureOut">
               <a:rPr lang="zh-CN" altLang="en-US" smtClean="0"/>
               <a:pPr/>
-              <a:t>2022-03-31</a:t>
+              <a:t>2022-04-11</a:t>
             </a:fld>
             <a:endParaRPr lang="zh-CN" altLang="en-US"/>
           </a:p>
@@ -1734,7 +1734,7 @@
             <a:fld id="{5CE71918-5BB5-48A1-B847-28BA0F6365FD}" type="datetimeFigureOut">
               <a:rPr lang="zh-CN" altLang="en-US" smtClean="0"/>
               <a:pPr/>
-              <a:t>2022-03-31</a:t>
+              <a:t>2022-04-11</a:t>
             </a:fld>
             <a:endParaRPr lang="zh-CN" altLang="en-US"/>
           </a:p>
@@ -3460,7 +3460,7 @@
             <a:fld id="{5CE71918-5BB5-48A1-B847-28BA0F6365FD}" type="datetimeFigureOut">
               <a:rPr lang="zh-CN" altLang="en-US" smtClean="0"/>
               <a:pPr/>
-              <a:t>2022-03-31</a:t>
+              <a:t>2022-04-11</a:t>
             </a:fld>
             <a:endParaRPr lang="zh-CN" altLang="en-US"/>
           </a:p>
@@ -3558,7 +3558,7 @@
               <a:pPr>
                 <a:defRPr/>
               </a:pPr>
-              <a:t>2022-03-31</a:t>
+              <a:t>2022-04-11</a:t>
             </a:fld>
             <a:endParaRPr lang="zh-CN" altLang="en-US"/>
           </a:p>
@@ -3849,7 +3849,7 @@
             <a:fld id="{5CE71918-5BB5-48A1-B847-28BA0F6365FD}" type="datetimeFigureOut">
               <a:rPr lang="zh-CN" altLang="en-US" smtClean="0"/>
               <a:pPr/>
-              <a:t>2022-03-31</a:t>
+              <a:t>2022-04-11</a:t>
             </a:fld>
             <a:endParaRPr lang="zh-CN" altLang="en-US"/>
           </a:p>
@@ -4132,7 +4132,7 @@
             <a:fld id="{5CE71918-5BB5-48A1-B847-28BA0F6365FD}" type="datetimeFigureOut">
               <a:rPr lang="zh-CN" altLang="en-US" smtClean="0"/>
               <a:pPr/>
-              <a:t>2022-03-31</a:t>
+              <a:t>2022-04-11</a:t>
             </a:fld>
             <a:endParaRPr lang="zh-CN" altLang="en-US"/>
           </a:p>
@@ -4554,7 +4554,7 @@
             <a:fld id="{5CE71918-5BB5-48A1-B847-28BA0F6365FD}" type="datetimeFigureOut">
               <a:rPr lang="zh-CN" altLang="en-US" smtClean="0"/>
               <a:pPr/>
-              <a:t>2022-03-31</a:t>
+              <a:t>2022-04-11</a:t>
             </a:fld>
             <a:endParaRPr lang="zh-CN" altLang="en-US"/>
           </a:p>
@@ -4669,7 +4669,7 @@
             <a:fld id="{5CE71918-5BB5-48A1-B847-28BA0F6365FD}" type="datetimeFigureOut">
               <a:rPr lang="zh-CN" altLang="en-US" smtClean="0"/>
               <a:pPr/>
-              <a:t>2022-03-31</a:t>
+              <a:t>2022-04-11</a:t>
             </a:fld>
             <a:endParaRPr lang="zh-CN" altLang="en-US"/>
           </a:p>
@@ -5390,7 +5390,7 @@
             <a:fld id="{5CE71918-5BB5-48A1-B847-28BA0F6365FD}" type="datetimeFigureOut">
               <a:rPr lang="zh-CN" altLang="en-US" smtClean="0"/>
               <a:pPr/>
-              <a:t>2022-03-31</a:t>
+              <a:t>2022-04-11</a:t>
             </a:fld>
             <a:endParaRPr lang="zh-CN" altLang="en-US"/>
           </a:p>
@@ -17798,27 +17798,22 @@
               <a:defRPr/>
             </a:pPr>
             <a:r>
-              <a:rPr lang="zh-CN" altLang="en-US" sz="2400" dirty="0">
+              <a:rPr kumimoji="0" lang="zh-CN" altLang="en-US" sz="2400" b="0" i="0" u="none" strike="noStrike" kern="1200" cap="none" spc="0" normalizeH="0" baseline="0" noProof="0" dirty="0">
+                <a:ln>
+                  <a:noFill/>
+                </a:ln>
+                <a:solidFill>
+                  <a:schemeClr val="tx1"/>
+                </a:solidFill>
+                <a:effectLst/>
+                <a:uLnTx/>
+                <a:uFillTx/>
                 <a:latin typeface="黑体" pitchFamily="49" charset="-122"/>
                 <a:ea typeface="黑体" pitchFamily="49" charset="-122"/>
                 <a:cs typeface="+mj-cs"/>
               </a:rPr>
-              <a:t>领域模型</a:t>
-            </a:r>
-            <a:endParaRPr kumimoji="0" lang="zh-CN" altLang="en-US" sz="2400" b="0" i="0" u="none" strike="noStrike" kern="1200" cap="none" spc="0" normalizeH="0" baseline="0" noProof="0" dirty="0">
-              <a:ln>
-                <a:noFill/>
-              </a:ln>
-              <a:solidFill>
-                <a:schemeClr val="tx1"/>
-              </a:solidFill>
-              <a:effectLst/>
-              <a:uLnTx/>
-              <a:uFillTx/>
-              <a:latin typeface="黑体" pitchFamily="49" charset="-122"/>
-              <a:ea typeface="黑体" pitchFamily="49" charset="-122"/>
-              <a:cs typeface="+mj-cs"/>
-            </a:endParaRPr>
+              <a:t>详细设计</a:t>
+            </a:r>
           </a:p>
         </p:txBody>
       </p:sp>
@@ -17861,6 +17856,64 @@
           </a:fontRef>
         </p:style>
       </p:cxnSp>
+      <p:sp>
+        <p:nvSpPr>
+          <p:cNvPr id="4" name="Rectangle 2">
+            <a:extLst>
+              <a:ext uri="{FF2B5EF4-FFF2-40B4-BE49-F238E27FC236}">
+                <a16:creationId xmlns:a16="http://schemas.microsoft.com/office/drawing/2014/main" id="{C3CFB04D-2D83-481E-8F4B-0D9ACFE733D3}"/>
+              </a:ext>
+            </a:extLst>
+          </p:cNvPr>
+          <p:cNvSpPr txBox="1">
+            <a:spLocks noChangeArrowheads="1"/>
+          </p:cNvSpPr>
+          <p:nvPr/>
+        </p:nvSpPr>
+        <p:spPr>
+          <a:xfrm>
+            <a:off x="0" y="2057400"/>
+            <a:ext cx="9144000" cy="514350"/>
+          </a:xfrm>
+          <a:prstGeom prst="rect">
+            <a:avLst/>
+          </a:prstGeom>
+        </p:spPr>
+        <p:txBody>
+          <a:bodyPr/>
+          <a:lstStyle/>
+          <a:p>
+            <a:pPr lvl="0" algn="ctr" defTabSz="914400" fontAlgn="auto">
+              <a:spcAft>
+                <a:spcPts val="0"/>
+              </a:spcAft>
+              <a:defRPr/>
+            </a:pPr>
+            <a:r>
+              <a:rPr lang="zh-CN" altLang="en-US" sz="2400" dirty="0">
+                <a:latin typeface="黑体" pitchFamily="49" charset="-122"/>
+                <a:ea typeface="黑体" pitchFamily="49" charset="-122"/>
+                <a:cs typeface="+mj-cs"/>
+              </a:rPr>
+              <a:t>代码即设计！</a:t>
+            </a:r>
+            <a:endParaRPr kumimoji="0" lang="zh-CN" altLang="en-US" sz="2400" b="0" i="0" u="none" strike="noStrike" kern="1200" cap="none" spc="0" normalizeH="0" baseline="0" noProof="0" dirty="0">
+              <a:ln>
+                <a:noFill/>
+              </a:ln>
+              <a:solidFill>
+                <a:schemeClr val="tx1"/>
+              </a:solidFill>
+              <a:effectLst/>
+              <a:uLnTx/>
+              <a:uFillTx/>
+              <a:latin typeface="黑体" pitchFamily="49" charset="-122"/>
+              <a:ea typeface="黑体" pitchFamily="49" charset="-122"/>
+              <a:cs typeface="+mj-cs"/>
+            </a:endParaRPr>
+          </a:p>
+        </p:txBody>
+      </p:sp>
     </p:spTree>
     <p:extLst>
       <p:ext uri="{BB962C8B-B14F-4D97-AF65-F5344CB8AC3E}">
@@ -18042,8 +18095,8 @@
         </p:nvSpPr>
         <p:spPr>
           <a:xfrm>
-            <a:off x="2446179" y="2057400"/>
-            <a:ext cx="4251642" cy="514350"/>
+            <a:off x="0" y="2057400"/>
+            <a:ext cx="9144000" cy="514350"/>
           </a:xfrm>
           <a:prstGeom prst="rect">
             <a:avLst/>

</xml_diff>